<commit_message>
fix : naming to feedback
</commit_message>
<xml_diff>
--- a/05/beom/python_data&memory.pptx
+++ b/05/beom/python_data&memory.pptx
@@ -6850,6 +6850,15 @@
               <a:buChar char="•"/>
             </a:pPr>
             <a:r>
+              <a:rPr lang="ko-KR" altLang="en-US" sz="2400" dirty="0">
+                <a:solidFill>
+                  <a:srgbClr val="000000"/>
+                </a:solidFill>
+                <a:latin typeface="-apple-system"/>
+              </a:rPr>
+              <a:t>해시</a:t>
+            </a:r>
+            <a:r>
               <a:rPr lang="ko-KR" altLang="en-US" sz="2400" b="0" i="0" dirty="0">
                 <a:solidFill>
                   <a:srgbClr val="000000"/>
@@ -6857,7 +6866,7 @@
                 <a:effectLst/>
                 <a:latin typeface="-apple-system"/>
               </a:rPr>
-              <a:t>캐시 충돌이 없는 경우 </a:t>
+              <a:t> 충돌이 없는 경우 </a:t>
             </a:r>
             <a:r>
               <a:rPr lang="en-US" altLang="ko-KR" sz="2400" b="0" i="0" dirty="0">
@@ -6876,6 +6885,15 @@
               <a:buChar char="•"/>
             </a:pPr>
             <a:r>
+              <a:rPr lang="ko-KR" altLang="en-US" sz="2400" dirty="0">
+                <a:solidFill>
+                  <a:srgbClr val="000000"/>
+                </a:solidFill>
+                <a:latin typeface="-apple-system"/>
+              </a:rPr>
+              <a:t>해시</a:t>
+            </a:r>
+            <a:r>
               <a:rPr lang="ko-KR" altLang="en-US" sz="2400" b="0" i="0" dirty="0">
                 <a:solidFill>
                   <a:srgbClr val="000000"/>
@@ -6883,7 +6901,7 @@
                 <a:effectLst/>
                 <a:latin typeface="-apple-system"/>
               </a:rPr>
-              <a:t>캐시 충돌이 있는 경우 </a:t>
+              <a:t> 충돌이 있는 경우 </a:t>
             </a:r>
             <a:r>
               <a:rPr lang="en-US" altLang="ko-KR" sz="2400" b="0" i="0" dirty="0">
@@ -12949,7 +12967,7 @@
         <p:spPr>
           <a:xfrm>
             <a:off x="771088" y="2090172"/>
-            <a:ext cx="10176545" cy="2308324"/>
+            <a:ext cx="10176545" cy="3046988"/>
           </a:xfrm>
           <a:prstGeom prst="rect">
             <a:avLst/>
@@ -13113,6 +13131,34 @@
                 <a:latin typeface="-apple-system"/>
               </a:rPr>
               <a:t>.</a:t>
+            </a:r>
+          </a:p>
+          <a:p>
+            <a:endParaRPr lang="en-US" altLang="ko-KR" sz="2400" dirty="0">
+              <a:solidFill>
+                <a:srgbClr val="000000"/>
+              </a:solidFill>
+              <a:latin typeface="-apple-system"/>
+            </a:endParaRPr>
+          </a:p>
+          <a:p>
+            <a:r>
+              <a:rPr lang="ko-KR" altLang="en-US" sz="2400" dirty="0">
+                <a:solidFill>
+                  <a:srgbClr val="000000"/>
+                </a:solidFill>
+                <a:latin typeface="-apple-system"/>
+              </a:rPr>
+              <a:t>멀티 스레드는 선점형 </a:t>
+            </a:r>
+            <a:r>
+              <a:rPr lang="ko-KR" altLang="en-US" sz="2400" dirty="0" err="1">
+                <a:solidFill>
+                  <a:srgbClr val="000000"/>
+                </a:solidFill>
+                <a:latin typeface="-apple-system"/>
+              </a:rPr>
+              <a:t>멀티테스킹</a:t>
             </a:r>
             <a:endParaRPr lang="en-US" altLang="ko-KR" sz="2400" dirty="0"/>
           </a:p>
@@ -13395,7 +13441,26 @@
                 <a:effectLst/>
                 <a:latin typeface="-apple-system"/>
               </a:rPr>
-              <a:t>영역을 제외한 모든 메모리를 공유하기 때문에 프로세스 간의 전환속도보다 스레드 간의 전환속도가 빠르다</a:t>
+              <a:t>영역을 제외한 </a:t>
+            </a:r>
+            <a:r>
+              <a:rPr lang="ko-KR" altLang="en-US" sz="2400" dirty="0">
+                <a:solidFill>
+                  <a:srgbClr val="000000"/>
+                </a:solidFill>
+                <a:latin typeface="-apple-system"/>
+              </a:rPr>
+              <a:t>대부분</a:t>
+            </a:r>
+            <a:r>
+              <a:rPr lang="ko-KR" altLang="en-US" sz="2400" b="0" i="0" dirty="0">
+                <a:solidFill>
+                  <a:srgbClr val="000000"/>
+                </a:solidFill>
+                <a:effectLst/>
+                <a:latin typeface="-apple-system"/>
+              </a:rPr>
+              <a:t> 메모리를 공유하기 때문에 프로세스 간의 전환속도보다 스레드 간의 전환속도가 빠르다</a:t>
             </a:r>
             <a:r>
               <a:rPr lang="en-US" altLang="ko-KR" sz="2400" dirty="0">

</xml_diff>